<commit_message>
update database, ppt, upload images,
</commit_message>
<xml_diff>
--- a/final_project.pptx
+++ b/final_project.pptx
@@ -3314,25 +3314,25 @@
     </dgm:pt>
   </dgm:ptLst>
   <dgm:cxnLst>
+    <dgm:cxn modelId="{1FDBE864-539D-408E-85E3-1A02F3608F1C}" srcId="{BF70A2BC-F55C-4C5C-95B7-DC5329E673A7}" destId="{736E50BE-5DBE-4B69-BB71-5F8987BFA341}" srcOrd="1" destOrd="0" parTransId="{3B4F6EE4-EC5C-42AC-8CBF-32D92376F0BF}" sibTransId="{254AF9A3-BDC6-46B7-8A17-B020012CE1D9}"/>
+    <dgm:cxn modelId="{611282F5-C145-40D4-B62A-C4BC7785D60B}" srcId="{BF70A2BC-F55C-4C5C-95B7-DC5329E673A7}" destId="{EE7B76D8-5A04-4610-99F6-794C3E59E208}" srcOrd="0" destOrd="0" parTransId="{7E48AAC2-D084-4E2E-92D2-597BBE075778}" sibTransId="{D175A62C-A264-4276-921B-FDDD5ECF06E0}"/>
+    <dgm:cxn modelId="{C8CA4020-75E3-4D9B-B37A-62CF1A0C4F5C}" type="presOf" srcId="{6EDED262-2059-44C0-BDC3-E8A562552D4A}" destId="{83425E95-6BB5-4ED0-8E47-2842AE508185}" srcOrd="1" destOrd="4" presId="urn:microsoft.com/office/officeart/2005/8/layout/vList4"/>
+    <dgm:cxn modelId="{1C094BB6-EF81-45AF-BA05-11FCC2EE5DDD}" type="presOf" srcId="{F5795272-2767-4B7B-B212-9E4DE40F1919}" destId="{83425E95-6BB5-4ED0-8E47-2842AE508185}" srcOrd="1" destOrd="3" presId="urn:microsoft.com/office/officeart/2005/8/layout/vList4"/>
+    <dgm:cxn modelId="{91D48274-C49D-474A-A3F4-F02B29E13019}" type="presOf" srcId="{BF70A2BC-F55C-4C5C-95B7-DC5329E673A7}" destId="{0B906849-CFF8-4E78-BA96-568A3E6D2C53}" srcOrd="0" destOrd="0" presId="urn:microsoft.com/office/officeart/2005/8/layout/vList4"/>
+    <dgm:cxn modelId="{87FE3007-F02A-4C01-B3B5-E9BF4D846AA4}" type="presOf" srcId="{BF70A2BC-F55C-4C5C-95B7-DC5329E673A7}" destId="{83425E95-6BB5-4ED0-8E47-2842AE508185}" srcOrd="1" destOrd="0" presId="urn:microsoft.com/office/officeart/2005/8/layout/vList4"/>
+    <dgm:cxn modelId="{557A9957-A3B3-4C44-851D-ED52A8F08FEA}" srcId="{BF70A2BC-F55C-4C5C-95B7-DC5329E673A7}" destId="{98EFCF74-7924-412A-8CEE-C5C0D45AD7EF}" srcOrd="4" destOrd="0" parTransId="{10246765-7A4B-40D5-87EF-258886DF4828}" sibTransId="{0F1DF7B5-6BE4-444C-A221-A8EADC672320}"/>
+    <dgm:cxn modelId="{88D54E45-8497-46CC-94E2-AA6928FF62F7}" srcId="{BF70A2BC-F55C-4C5C-95B7-DC5329E673A7}" destId="{6EDED262-2059-44C0-BDC3-E8A562552D4A}" srcOrd="3" destOrd="0" parTransId="{36497893-9948-466F-8251-4CB6C0746282}" sibTransId="{0199D02C-D2EB-42E6-A24A-8D59E41972D6}"/>
+    <dgm:cxn modelId="{6C2D4AFE-CA01-4171-B49A-766B98C20435}" type="presOf" srcId="{EE7B76D8-5A04-4610-99F6-794C3E59E208}" destId="{0B906849-CFF8-4E78-BA96-568A3E6D2C53}" srcOrd="0" destOrd="1" presId="urn:microsoft.com/office/officeart/2005/8/layout/vList4"/>
+    <dgm:cxn modelId="{8B7C893A-95E3-4D5A-9895-C79BAC216C7A}" srcId="{BF70A2BC-F55C-4C5C-95B7-DC5329E673A7}" destId="{F5795272-2767-4B7B-B212-9E4DE40F1919}" srcOrd="2" destOrd="0" parTransId="{359EF25B-C331-41DC-A30E-B5669E0B0D9E}" sibTransId="{1E8F3A51-16AC-4E69-924F-7BF286468B6E}"/>
+    <dgm:cxn modelId="{6BA80430-A569-46DC-B608-B8179A2836FD}" type="presOf" srcId="{736E50BE-5DBE-4B69-BB71-5F8987BFA341}" destId="{0B906849-CFF8-4E78-BA96-568A3E6D2C53}" srcOrd="0" destOrd="2" presId="urn:microsoft.com/office/officeart/2005/8/layout/vList4"/>
+    <dgm:cxn modelId="{B65ED16C-B23A-4D25-8A03-96CC0D917A89}" srcId="{E02A8243-9315-404B-83BC-2ADD496085A6}" destId="{BF70A2BC-F55C-4C5C-95B7-DC5329E673A7}" srcOrd="0" destOrd="0" parTransId="{DCFA195B-0FF9-400D-8239-5FAF58DF5EB0}" sibTransId="{A85A0E71-91E1-4984-AB29-1282732BDCE6}"/>
+    <dgm:cxn modelId="{1EF8B61E-876B-45FD-967F-F850A9679371}" type="presOf" srcId="{98EFCF74-7924-412A-8CEE-C5C0D45AD7EF}" destId="{83425E95-6BB5-4ED0-8E47-2842AE508185}" srcOrd="1" destOrd="5" presId="urn:microsoft.com/office/officeart/2005/8/layout/vList4"/>
+    <dgm:cxn modelId="{B397A2C3-98E6-448F-B710-059498D25BAD}" type="presOf" srcId="{EE7B76D8-5A04-4610-99F6-794C3E59E208}" destId="{83425E95-6BB5-4ED0-8E47-2842AE508185}" srcOrd="1" destOrd="1" presId="urn:microsoft.com/office/officeart/2005/8/layout/vList4"/>
+    <dgm:cxn modelId="{68D061E4-E0EF-4E76-A836-7CF782A8ADB7}" type="presOf" srcId="{98EFCF74-7924-412A-8CEE-C5C0D45AD7EF}" destId="{0B906849-CFF8-4E78-BA96-568A3E6D2C53}" srcOrd="0" destOrd="5" presId="urn:microsoft.com/office/officeart/2005/8/layout/vList4"/>
+    <dgm:cxn modelId="{F2ED3A6A-6C08-4211-ACA2-D18458EDCB9B}" type="presOf" srcId="{E02A8243-9315-404B-83BC-2ADD496085A6}" destId="{AD2407BE-247E-47DD-A328-3C7E353C1415}" srcOrd="0" destOrd="0" presId="urn:microsoft.com/office/officeart/2005/8/layout/vList4"/>
+    <dgm:cxn modelId="{75B6E60F-1189-4265-991A-B9415EBAF333}" type="presOf" srcId="{736E50BE-5DBE-4B69-BB71-5F8987BFA341}" destId="{83425E95-6BB5-4ED0-8E47-2842AE508185}" srcOrd="1" destOrd="2" presId="urn:microsoft.com/office/officeart/2005/8/layout/vList4"/>
+    <dgm:cxn modelId="{AC8AD4D2-DFF7-48F1-90BB-DA6AF5AD6E3C}" type="presOf" srcId="{6EDED262-2059-44C0-BDC3-E8A562552D4A}" destId="{0B906849-CFF8-4E78-BA96-568A3E6D2C53}" srcOrd="0" destOrd="4" presId="urn:microsoft.com/office/officeart/2005/8/layout/vList4"/>
     <dgm:cxn modelId="{A307EB41-74F3-4A4A-950A-F49EE17784DF}" type="presOf" srcId="{F5795272-2767-4B7B-B212-9E4DE40F1919}" destId="{0B906849-CFF8-4E78-BA96-568A3E6D2C53}" srcOrd="0" destOrd="3" presId="urn:microsoft.com/office/officeart/2005/8/layout/vList4"/>
-    <dgm:cxn modelId="{1EF8B61E-876B-45FD-967F-F850A9679371}" type="presOf" srcId="{98EFCF74-7924-412A-8CEE-C5C0D45AD7EF}" destId="{83425E95-6BB5-4ED0-8E47-2842AE508185}" srcOrd="1" destOrd="5" presId="urn:microsoft.com/office/officeart/2005/8/layout/vList4"/>
-    <dgm:cxn modelId="{AC8AD4D2-DFF7-48F1-90BB-DA6AF5AD6E3C}" type="presOf" srcId="{6EDED262-2059-44C0-BDC3-E8A562552D4A}" destId="{0B906849-CFF8-4E78-BA96-568A3E6D2C53}" srcOrd="0" destOrd="4" presId="urn:microsoft.com/office/officeart/2005/8/layout/vList4"/>
-    <dgm:cxn modelId="{75B6E60F-1189-4265-991A-B9415EBAF333}" type="presOf" srcId="{736E50BE-5DBE-4B69-BB71-5F8987BFA341}" destId="{83425E95-6BB5-4ED0-8E47-2842AE508185}" srcOrd="1" destOrd="2" presId="urn:microsoft.com/office/officeart/2005/8/layout/vList4"/>
-    <dgm:cxn modelId="{68D061E4-E0EF-4E76-A836-7CF782A8ADB7}" type="presOf" srcId="{98EFCF74-7924-412A-8CEE-C5C0D45AD7EF}" destId="{0B906849-CFF8-4E78-BA96-568A3E6D2C53}" srcOrd="0" destOrd="5" presId="urn:microsoft.com/office/officeart/2005/8/layout/vList4"/>
-    <dgm:cxn modelId="{6BA80430-A569-46DC-B608-B8179A2836FD}" type="presOf" srcId="{736E50BE-5DBE-4B69-BB71-5F8987BFA341}" destId="{0B906849-CFF8-4E78-BA96-568A3E6D2C53}" srcOrd="0" destOrd="2" presId="urn:microsoft.com/office/officeart/2005/8/layout/vList4"/>
-    <dgm:cxn modelId="{87FE3007-F02A-4C01-B3B5-E9BF4D846AA4}" type="presOf" srcId="{BF70A2BC-F55C-4C5C-95B7-DC5329E673A7}" destId="{83425E95-6BB5-4ED0-8E47-2842AE508185}" srcOrd="1" destOrd="0" presId="urn:microsoft.com/office/officeart/2005/8/layout/vList4"/>
-    <dgm:cxn modelId="{1C094BB6-EF81-45AF-BA05-11FCC2EE5DDD}" type="presOf" srcId="{F5795272-2767-4B7B-B212-9E4DE40F1919}" destId="{83425E95-6BB5-4ED0-8E47-2842AE508185}" srcOrd="1" destOrd="3" presId="urn:microsoft.com/office/officeart/2005/8/layout/vList4"/>
-    <dgm:cxn modelId="{8B7C893A-95E3-4D5A-9895-C79BAC216C7A}" srcId="{BF70A2BC-F55C-4C5C-95B7-DC5329E673A7}" destId="{F5795272-2767-4B7B-B212-9E4DE40F1919}" srcOrd="2" destOrd="0" parTransId="{359EF25B-C331-41DC-A30E-B5669E0B0D9E}" sibTransId="{1E8F3A51-16AC-4E69-924F-7BF286468B6E}"/>
-    <dgm:cxn modelId="{6C2D4AFE-CA01-4171-B49A-766B98C20435}" type="presOf" srcId="{EE7B76D8-5A04-4610-99F6-794C3E59E208}" destId="{0B906849-CFF8-4E78-BA96-568A3E6D2C53}" srcOrd="0" destOrd="1" presId="urn:microsoft.com/office/officeart/2005/8/layout/vList4"/>
-    <dgm:cxn modelId="{C8CA4020-75E3-4D9B-B37A-62CF1A0C4F5C}" type="presOf" srcId="{6EDED262-2059-44C0-BDC3-E8A562552D4A}" destId="{83425E95-6BB5-4ED0-8E47-2842AE508185}" srcOrd="1" destOrd="4" presId="urn:microsoft.com/office/officeart/2005/8/layout/vList4"/>
-    <dgm:cxn modelId="{91D48274-C49D-474A-A3F4-F02B29E13019}" type="presOf" srcId="{BF70A2BC-F55C-4C5C-95B7-DC5329E673A7}" destId="{0B906849-CFF8-4E78-BA96-568A3E6D2C53}" srcOrd="0" destOrd="0" presId="urn:microsoft.com/office/officeart/2005/8/layout/vList4"/>
-    <dgm:cxn modelId="{F2ED3A6A-6C08-4211-ACA2-D18458EDCB9B}" type="presOf" srcId="{E02A8243-9315-404B-83BC-2ADD496085A6}" destId="{AD2407BE-247E-47DD-A328-3C7E353C1415}" srcOrd="0" destOrd="0" presId="urn:microsoft.com/office/officeart/2005/8/layout/vList4"/>
-    <dgm:cxn modelId="{1FDBE864-539D-408E-85E3-1A02F3608F1C}" srcId="{BF70A2BC-F55C-4C5C-95B7-DC5329E673A7}" destId="{736E50BE-5DBE-4B69-BB71-5F8987BFA341}" srcOrd="1" destOrd="0" parTransId="{3B4F6EE4-EC5C-42AC-8CBF-32D92376F0BF}" sibTransId="{254AF9A3-BDC6-46B7-8A17-B020012CE1D9}"/>
-    <dgm:cxn modelId="{B65ED16C-B23A-4D25-8A03-96CC0D917A89}" srcId="{E02A8243-9315-404B-83BC-2ADD496085A6}" destId="{BF70A2BC-F55C-4C5C-95B7-DC5329E673A7}" srcOrd="0" destOrd="0" parTransId="{DCFA195B-0FF9-400D-8239-5FAF58DF5EB0}" sibTransId="{A85A0E71-91E1-4984-AB29-1282732BDCE6}"/>
-    <dgm:cxn modelId="{611282F5-C145-40D4-B62A-C4BC7785D60B}" srcId="{BF70A2BC-F55C-4C5C-95B7-DC5329E673A7}" destId="{EE7B76D8-5A04-4610-99F6-794C3E59E208}" srcOrd="0" destOrd="0" parTransId="{7E48AAC2-D084-4E2E-92D2-597BBE075778}" sibTransId="{D175A62C-A264-4276-921B-FDDD5ECF06E0}"/>
-    <dgm:cxn modelId="{B397A2C3-98E6-448F-B710-059498D25BAD}" type="presOf" srcId="{EE7B76D8-5A04-4610-99F6-794C3E59E208}" destId="{83425E95-6BB5-4ED0-8E47-2842AE508185}" srcOrd="1" destOrd="1" presId="urn:microsoft.com/office/officeart/2005/8/layout/vList4"/>
-    <dgm:cxn modelId="{88D54E45-8497-46CC-94E2-AA6928FF62F7}" srcId="{BF70A2BC-F55C-4C5C-95B7-DC5329E673A7}" destId="{6EDED262-2059-44C0-BDC3-E8A562552D4A}" srcOrd="3" destOrd="0" parTransId="{36497893-9948-466F-8251-4CB6C0746282}" sibTransId="{0199D02C-D2EB-42E6-A24A-8D59E41972D6}"/>
-    <dgm:cxn modelId="{557A9957-A3B3-4C44-851D-ED52A8F08FEA}" srcId="{BF70A2BC-F55C-4C5C-95B7-DC5329E673A7}" destId="{98EFCF74-7924-412A-8CEE-C5C0D45AD7EF}" srcOrd="4" destOrd="0" parTransId="{10246765-7A4B-40D5-87EF-258886DF4828}" sibTransId="{0F1DF7B5-6BE4-444C-A221-A8EADC672320}"/>
     <dgm:cxn modelId="{61BFDC48-0F91-455D-9D3D-2E4183D1A2AC}" type="presParOf" srcId="{AD2407BE-247E-47DD-A328-3C7E353C1415}" destId="{A483763C-A1A2-4AC2-B0F2-F1CB7FCABC72}" srcOrd="0" destOrd="0" presId="urn:microsoft.com/office/officeart/2005/8/layout/vList4"/>
     <dgm:cxn modelId="{4B7CB803-0720-42C6-9E1D-A4907B6D5616}" type="presParOf" srcId="{A483763C-A1A2-4AC2-B0F2-F1CB7FCABC72}" destId="{0B906849-CFF8-4E78-BA96-568A3E6D2C53}" srcOrd="0" destOrd="0" presId="urn:microsoft.com/office/officeart/2005/8/layout/vList4"/>
     <dgm:cxn modelId="{310C31E8-1907-456D-9F03-3D350897D021}" type="presParOf" srcId="{A483763C-A1A2-4AC2-B0F2-F1CB7FCABC72}" destId="{685997F9-7933-4967-B61A-2621F57A5682}" srcOrd="1" destOrd="0" presId="urn:microsoft.com/office/officeart/2005/8/layout/vList4"/>
@@ -22550,7 +22550,7 @@
           <p:cNvPr id="4" name="Rectangle 3">
             <a:extLst>
               <a:ext uri="{FF2B5EF4-FFF2-40B4-BE49-F238E27FC236}">
-                <a16:creationId xmlns:a16="http://schemas.microsoft.com/office/drawing/2014/main" xmlns="" id="{9BF65F1D-032E-4BC9-965B-AC131CD9699D}"/>
+                <a16:creationId xmlns="" xmlns:a16="http://schemas.microsoft.com/office/drawing/2014/main" id="{9BF65F1D-032E-4BC9-965B-AC131CD9699D}"/>
               </a:ext>
             </a:extLst>
           </p:cNvPr>
@@ -22748,7 +22748,7 @@
           <p:cNvPr id="4" name="Rectangle 3">
             <a:extLst>
               <a:ext uri="{FF2B5EF4-FFF2-40B4-BE49-F238E27FC236}">
-                <a16:creationId xmlns:a16="http://schemas.microsoft.com/office/drawing/2014/main" xmlns="" id="{9BF65F1D-032E-4BC9-965B-AC131CD9699D}"/>
+                <a16:creationId xmlns="" xmlns:a16="http://schemas.microsoft.com/office/drawing/2014/main" id="{9BF65F1D-032E-4BC9-965B-AC131CD9699D}"/>
               </a:ext>
             </a:extLst>
           </p:cNvPr>
@@ -24976,7 +24976,7 @@
       </p:sp>
       <p:pic>
         <p:nvPicPr>
-          <p:cNvPr id="1026" name="Picture 2" descr="C:\Users\Sony Vaio\Desktop\manga.png"/>
+          <p:cNvPr id="1029" name="Picture 5" descr="C:\Users\Sony Vaio\Desktop\manga.png"/>
           <p:cNvPicPr>
             <a:picLocks noGrp="1" noChangeAspect="1" noChangeArrowheads="1"/>
           </p:cNvPicPr>
@@ -24999,8 +24999,8 @@
         </p:blipFill>
         <p:spPr bwMode="auto">
           <a:xfrm>
-            <a:off x="457200" y="1525558"/>
-            <a:ext cx="7657776" cy="4075142"/>
+            <a:off x="228599" y="1409700"/>
+            <a:ext cx="7852385" cy="4114800"/>
           </a:xfrm>
           <a:prstGeom prst="rect">
             <a:avLst/>

</xml_diff>